<commit_message>
Working on some stages
</commit_message>
<xml_diff>
--- a/16-20 rounds/A Stage Has No Name - 16 rounds - Comstock/A Stage Has No Name.pptx
+++ b/16-20 rounds/A Stage Has No Name - 16 rounds - Comstock/A Stage Has No Name.pptx
@@ -258,7 +258,7 @@
               <a:pPr>
                 <a:defRPr/>
               </a:pPr>
-              <a:t>7/8/2019</a:t>
+              <a:t>7/18/2019</a:t>
             </a:fld>
             <a:endParaRPr lang="en-US"/>
           </a:p>
@@ -4159,7 +4159,7 @@
           <p:nvPr>
             <p:extLst>
               <p:ext uri="{D42A27DB-BD31-4B8C-83A1-F6EECF244321}">
-                <p14:modId xmlns:p14="http://schemas.microsoft.com/office/powerpoint/2010/main" val="2811723696"/>
+                <p14:modId xmlns:p14="http://schemas.microsoft.com/office/powerpoint/2010/main" val="3742631339"/>
               </p:ext>
             </p:extLst>
           </p:nvPr>
@@ -4570,7 +4570,31 @@
                           <a:ea typeface="Arial" pitchFamily="34"/>
                           <a:cs typeface="Arial" pitchFamily="34"/>
                         </a:rPr>
-                        <a:t>Standing anywhere outside the shooting box. Hands relaxed at sides.</a:t>
+                        <a:t>Standing in the shooting box, facing </a:t>
+                      </a:r>
+                      <a:r>
+                        <a:rPr lang="en-US" sz="1100" b="1" i="0" u="none" strike="noStrike" kern="1200" cap="none" spc="0" baseline="0" dirty="0" err="1">
+                          <a:solidFill>
+                            <a:srgbClr val="000000"/>
+                          </a:solidFill>
+                          <a:uFillTx/>
+                          <a:latin typeface="Arial" pitchFamily="34"/>
+                          <a:ea typeface="Arial" pitchFamily="34"/>
+                          <a:cs typeface="Arial" pitchFamily="34"/>
+                        </a:rPr>
+                        <a:t>uprange</a:t>
+                      </a:r>
+                      <a:r>
+                        <a:rPr lang="en-US" sz="1100" b="1" i="0" u="none" strike="noStrike" kern="1200" cap="none" spc="0" baseline="0" dirty="0">
+                          <a:solidFill>
+                            <a:srgbClr val="000000"/>
+                          </a:solidFill>
+                          <a:uFillTx/>
+                          <a:latin typeface="Arial" pitchFamily="34"/>
+                          <a:ea typeface="Arial" pitchFamily="34"/>
+                          <a:cs typeface="Arial" pitchFamily="34"/>
+                        </a:rPr>
+                        <a:t>. Hands relaxed at sides.</a:t>
                       </a:r>
                     </a:p>
                     <a:p>

</xml_diff>